<commit_message>
add nat info & img
</commit_message>
<xml_diff>
--- a/プレゼンテーション1.pptx
+++ b/プレゼンテーション1.pptx
@@ -10,6 +10,7 @@
     <p:sldId id="258" r:id="rId4"/>
     <p:sldId id="259" r:id="rId5"/>
     <p:sldId id="260" r:id="rId6"/>
+    <p:sldId id="261" r:id="rId7"/>
   </p:sldIdLst>
   <p:sldSz cx="12192000" cy="6858000"/>
   <p:notesSz cx="6858000" cy="9144000"/>
@@ -263,7 +264,7 @@
           <a:p>
             <a:fld id="{B028AF54-4F31-4185-9BCC-82736DF9727A}" type="datetimeFigureOut">
               <a:rPr kumimoji="1" lang="ja-JP" altLang="en-US" smtClean="0"/>
-              <a:t>2018/12/28</a:t>
+              <a:t>2018/12/29</a:t>
             </a:fld>
             <a:endParaRPr kumimoji="1" lang="ja-JP" altLang="en-US"/>
           </a:p>
@@ -493,7 +494,7 @@
           <a:p>
             <a:fld id="{B028AF54-4F31-4185-9BCC-82736DF9727A}" type="datetimeFigureOut">
               <a:rPr kumimoji="1" lang="ja-JP" altLang="en-US" smtClean="0"/>
-              <a:t>2018/12/28</a:t>
+              <a:t>2018/12/29</a:t>
             </a:fld>
             <a:endParaRPr kumimoji="1" lang="ja-JP" altLang="en-US"/>
           </a:p>
@@ -733,7 +734,7 @@
           <a:p>
             <a:fld id="{B028AF54-4F31-4185-9BCC-82736DF9727A}" type="datetimeFigureOut">
               <a:rPr kumimoji="1" lang="ja-JP" altLang="en-US" smtClean="0"/>
-              <a:t>2018/12/28</a:t>
+              <a:t>2018/12/29</a:t>
             </a:fld>
             <a:endParaRPr kumimoji="1" lang="ja-JP" altLang="en-US"/>
           </a:p>
@@ -963,7 +964,7 @@
           <a:p>
             <a:fld id="{B028AF54-4F31-4185-9BCC-82736DF9727A}" type="datetimeFigureOut">
               <a:rPr kumimoji="1" lang="ja-JP" altLang="en-US" smtClean="0"/>
-              <a:t>2018/12/28</a:t>
+              <a:t>2018/12/29</a:t>
             </a:fld>
             <a:endParaRPr kumimoji="1" lang="ja-JP" altLang="en-US"/>
           </a:p>
@@ -1238,7 +1239,7 @@
           <a:p>
             <a:fld id="{B028AF54-4F31-4185-9BCC-82736DF9727A}" type="datetimeFigureOut">
               <a:rPr kumimoji="1" lang="ja-JP" altLang="en-US" smtClean="0"/>
-              <a:t>2018/12/28</a:t>
+              <a:t>2018/12/29</a:t>
             </a:fld>
             <a:endParaRPr kumimoji="1" lang="ja-JP" altLang="en-US"/>
           </a:p>
@@ -1567,7 +1568,7 @@
           <a:p>
             <a:fld id="{B028AF54-4F31-4185-9BCC-82736DF9727A}" type="datetimeFigureOut">
               <a:rPr kumimoji="1" lang="ja-JP" altLang="en-US" smtClean="0"/>
-              <a:t>2018/12/28</a:t>
+              <a:t>2018/12/29</a:t>
             </a:fld>
             <a:endParaRPr kumimoji="1" lang="ja-JP" altLang="en-US"/>
           </a:p>
@@ -2043,7 +2044,7 @@
           <a:p>
             <a:fld id="{B028AF54-4F31-4185-9BCC-82736DF9727A}" type="datetimeFigureOut">
               <a:rPr kumimoji="1" lang="ja-JP" altLang="en-US" smtClean="0"/>
-              <a:t>2018/12/28</a:t>
+              <a:t>2018/12/29</a:t>
             </a:fld>
             <a:endParaRPr kumimoji="1" lang="ja-JP" altLang="en-US"/>
           </a:p>
@@ -2184,7 +2185,7 @@
           <a:p>
             <a:fld id="{B028AF54-4F31-4185-9BCC-82736DF9727A}" type="datetimeFigureOut">
               <a:rPr kumimoji="1" lang="ja-JP" altLang="en-US" smtClean="0"/>
-              <a:t>2018/12/28</a:t>
+              <a:t>2018/12/29</a:t>
             </a:fld>
             <a:endParaRPr kumimoji="1" lang="ja-JP" altLang="en-US"/>
           </a:p>
@@ -2297,7 +2298,7 @@
           <a:p>
             <a:fld id="{B028AF54-4F31-4185-9BCC-82736DF9727A}" type="datetimeFigureOut">
               <a:rPr kumimoji="1" lang="ja-JP" altLang="en-US" smtClean="0"/>
-              <a:t>2018/12/28</a:t>
+              <a:t>2018/12/29</a:t>
             </a:fld>
             <a:endParaRPr kumimoji="1" lang="ja-JP" altLang="en-US"/>
           </a:p>
@@ -2640,7 +2641,7 @@
           <a:p>
             <a:fld id="{B028AF54-4F31-4185-9BCC-82736DF9727A}" type="datetimeFigureOut">
               <a:rPr kumimoji="1" lang="ja-JP" altLang="en-US" smtClean="0"/>
-              <a:t>2018/12/28</a:t>
+              <a:t>2018/12/29</a:t>
             </a:fld>
             <a:endParaRPr kumimoji="1" lang="ja-JP" altLang="en-US"/>
           </a:p>
@@ -2928,7 +2929,7 @@
           <a:p>
             <a:fld id="{B028AF54-4F31-4185-9BCC-82736DF9727A}" type="datetimeFigureOut">
               <a:rPr kumimoji="1" lang="ja-JP" altLang="en-US" smtClean="0"/>
-              <a:t>2018/12/28</a:t>
+              <a:t>2018/12/29</a:t>
             </a:fld>
             <a:endParaRPr kumimoji="1" lang="ja-JP" altLang="en-US"/>
           </a:p>
@@ -3201,7 +3202,7 @@
           <a:p>
             <a:fld id="{B028AF54-4F31-4185-9BCC-82736DF9727A}" type="datetimeFigureOut">
               <a:rPr kumimoji="1" lang="ja-JP" altLang="en-US" smtClean="0"/>
-              <a:t>2018/12/28</a:t>
+              <a:t>2018/12/29</a:t>
             </a:fld>
             <a:endParaRPr kumimoji="1" lang="ja-JP" altLang="en-US"/>
           </a:p>
@@ -3734,8 +3735,21 @@
                   <a:sysClr val="windowText" lastClr="000000"/>
                 </a:solidFill>
               </a:rPr>
-              <a:t>ユーザーモード</a:t>
-            </a:r>
+              <a:t>ユーザー</a:t>
+            </a:r>
+            <a:r>
+              <a:rPr kumimoji="1" lang="en-US" altLang="ja-JP" sz="2800" dirty="0">
+                <a:solidFill>
+                  <a:sysClr val="windowText" lastClr="000000"/>
+                </a:solidFill>
+              </a:rPr>
+              <a:t>EXEC</a:t>
+            </a:r>
+            <a:endParaRPr kumimoji="1" lang="ja-JP" altLang="en-US" sz="2800" dirty="0">
+              <a:solidFill>
+                <a:sysClr val="windowText" lastClr="000000"/>
+              </a:solidFill>
+            </a:endParaRPr>
           </a:p>
         </p:txBody>
       </p:sp>
@@ -3840,7 +3854,15 @@
                   <a:schemeClr val="tx1"/>
                 </a:solidFill>
               </a:rPr>
-              <a:t>特権モード</a:t>
+              <a:t>特権</a:t>
+            </a:r>
+            <a:r>
+              <a:rPr lang="en-US" altLang="ja-JP" sz="2400" dirty="0">
+                <a:solidFill>
+                  <a:schemeClr val="tx1"/>
+                </a:solidFill>
+              </a:rPr>
+              <a:t>EXEC</a:t>
             </a:r>
             <a:endParaRPr kumimoji="1" lang="ja-JP" altLang="en-US" sz="2400" dirty="0">
               <a:solidFill>
@@ -5095,6 +5117,36 @@
         <p:spPr>
           <a:xfrm>
             <a:off x="1834526" y="1020871"/>
+            <a:ext cx="8522947" cy="4816257"/>
+          </a:xfrm>
+          <a:prstGeom prst="rect">
+            <a:avLst/>
+          </a:prstGeom>
+        </p:spPr>
+      </p:pic>
+      <p:pic>
+        <p:nvPicPr>
+          <p:cNvPr id="3" name="図 2">
+            <a:extLst>
+              <a:ext uri="{FF2B5EF4-FFF2-40B4-BE49-F238E27FC236}">
+                <a16:creationId xmlns:a16="http://schemas.microsoft.com/office/drawing/2014/main" id="{180A725B-CE31-4827-8E1C-F0C54470529D}"/>
+              </a:ext>
+            </a:extLst>
+          </p:cNvPr>
+          <p:cNvPicPr>
+            <a:picLocks noChangeAspect="1"/>
+          </p:cNvPicPr>
+          <p:nvPr/>
+        </p:nvPicPr>
+        <p:blipFill>
+          <a:blip r:embed="rId3"/>
+          <a:stretch>
+            <a:fillRect/>
+          </a:stretch>
+        </p:blipFill>
+        <p:spPr>
+          <a:xfrm>
+            <a:off x="1986926" y="1173271"/>
             <a:ext cx="8522947" cy="4816257"/>
           </a:xfrm>
           <a:prstGeom prst="rect">
@@ -5585,10 +5637,1130 @@
           </a:prstGeom>
         </p:spPr>
       </p:pic>
+      <p:pic>
+        <p:nvPicPr>
+          <p:cNvPr id="3" name="図 2">
+            <a:extLst>
+              <a:ext uri="{FF2B5EF4-FFF2-40B4-BE49-F238E27FC236}">
+                <a16:creationId xmlns:a16="http://schemas.microsoft.com/office/drawing/2014/main" id="{B31136F5-7D86-4BD6-AFDC-764B72661399}"/>
+              </a:ext>
+            </a:extLst>
+          </p:cNvPr>
+          <p:cNvPicPr>
+            <a:picLocks noChangeAspect="1"/>
+          </p:cNvPicPr>
+          <p:nvPr/>
+        </p:nvPicPr>
+        <p:blipFill>
+          <a:blip r:embed="rId3"/>
+          <a:stretch>
+            <a:fillRect/>
+          </a:stretch>
+        </p:blipFill>
+        <p:spPr>
+          <a:xfrm>
+            <a:off x="3047736" y="1714351"/>
+            <a:ext cx="6096528" cy="3429297"/>
+          </a:xfrm>
+          <a:prstGeom prst="rect">
+            <a:avLst/>
+          </a:prstGeom>
+        </p:spPr>
+      </p:pic>
+      <p:pic>
+        <p:nvPicPr>
+          <p:cNvPr id="4" name="図 3">
+            <a:extLst>
+              <a:ext uri="{FF2B5EF4-FFF2-40B4-BE49-F238E27FC236}">
+                <a16:creationId xmlns:a16="http://schemas.microsoft.com/office/drawing/2014/main" id="{3BE9A8D3-18B5-4BD1-8988-AA12CFABA57E}"/>
+              </a:ext>
+            </a:extLst>
+          </p:cNvPr>
+          <p:cNvPicPr>
+            <a:picLocks noChangeAspect="1"/>
+          </p:cNvPicPr>
+          <p:nvPr/>
+        </p:nvPicPr>
+        <p:blipFill>
+          <a:blip r:embed="rId4"/>
+          <a:stretch>
+            <a:fillRect/>
+          </a:stretch>
+        </p:blipFill>
+        <p:spPr>
+          <a:xfrm>
+            <a:off x="3200136" y="1866751"/>
+            <a:ext cx="6096528" cy="3429297"/>
+          </a:xfrm>
+          <a:prstGeom prst="rect">
+            <a:avLst/>
+          </a:prstGeom>
+        </p:spPr>
+      </p:pic>
     </p:spTree>
     <p:extLst>
       <p:ext uri="{BB962C8B-B14F-4D97-AF65-F5344CB8AC3E}">
         <p14:creationId xmlns:p14="http://schemas.microsoft.com/office/powerpoint/2010/main" val="658961348"/>
+      </p:ext>
+    </p:extLst>
+  </p:cSld>
+  <p:clrMapOvr>
+    <a:masterClrMapping/>
+  </p:clrMapOvr>
+</p:sld>
+</file>
+
+<file path=ppt/slides/slide6.xml><?xml version="1.0" encoding="utf-8"?>
+<p:sld xmlns:a="http://schemas.openxmlformats.org/drawingml/2006/main" xmlns:r="http://schemas.openxmlformats.org/officeDocument/2006/relationships" xmlns:p="http://schemas.openxmlformats.org/presentationml/2006/main">
+  <p:cSld>
+    <p:spTree>
+      <p:nvGrpSpPr>
+        <p:cNvPr id="1" name=""/>
+        <p:cNvGrpSpPr/>
+        <p:nvPr/>
+      </p:nvGrpSpPr>
+      <p:grpSpPr>
+        <a:xfrm>
+          <a:off x="0" y="0"/>
+          <a:ext cx="0" cy="0"/>
+          <a:chOff x="0" y="0"/>
+          <a:chExt cx="0" cy="0"/>
+        </a:xfrm>
+      </p:grpSpPr>
+      <p:sp>
+        <p:nvSpPr>
+          <p:cNvPr id="24" name="正方形/長方形 23">
+            <a:extLst>
+              <a:ext uri="{FF2B5EF4-FFF2-40B4-BE49-F238E27FC236}">
+                <a16:creationId xmlns:a16="http://schemas.microsoft.com/office/drawing/2014/main" id="{1C37B5F3-E35C-430E-9BF4-B6EEEC8735C1}"/>
+              </a:ext>
+            </a:extLst>
+          </p:cNvPr>
+          <p:cNvSpPr/>
+          <p:nvPr/>
+        </p:nvSpPr>
+        <p:spPr>
+          <a:xfrm>
+            <a:off x="2651937" y="2647072"/>
+            <a:ext cx="3179367" cy="1563855"/>
+          </a:xfrm>
+          <a:prstGeom prst="rect">
+            <a:avLst/>
+          </a:prstGeom>
+          <a:solidFill>
+            <a:schemeClr val="accent6">
+              <a:lumMod val="40000"/>
+              <a:lumOff val="60000"/>
+            </a:schemeClr>
+          </a:solidFill>
+          <a:ln>
+            <a:solidFill>
+              <a:schemeClr val="accent6">
+                <a:lumMod val="50000"/>
+              </a:schemeClr>
+            </a:solidFill>
+          </a:ln>
+        </p:spPr>
+        <p:style>
+          <a:lnRef idx="2">
+            <a:schemeClr val="accent1">
+              <a:shade val="50000"/>
+            </a:schemeClr>
+          </a:lnRef>
+          <a:fillRef idx="1">
+            <a:schemeClr val="accent1"/>
+          </a:fillRef>
+          <a:effectRef idx="0">
+            <a:schemeClr val="accent1"/>
+          </a:effectRef>
+          <a:fontRef idx="minor">
+            <a:schemeClr val="lt1"/>
+          </a:fontRef>
+        </p:style>
+        <p:txBody>
+          <a:bodyPr rtlCol="0" anchor="ctr"/>
+          <a:lstStyle/>
+          <a:p>
+            <a:pPr algn="ctr"/>
+            <a:endParaRPr kumimoji="1" lang="ja-JP" altLang="en-US"/>
+          </a:p>
+        </p:txBody>
+      </p:sp>
+      <p:grpSp>
+        <p:nvGrpSpPr>
+          <p:cNvPr id="13" name="グループ化 12">
+            <a:extLst>
+              <a:ext uri="{FF2B5EF4-FFF2-40B4-BE49-F238E27FC236}">
+                <a16:creationId xmlns:a16="http://schemas.microsoft.com/office/drawing/2014/main" id="{22A9C7D6-A745-46F3-BC7B-D00FE191B33F}"/>
+              </a:ext>
+            </a:extLst>
+          </p:cNvPr>
+          <p:cNvGrpSpPr/>
+          <p:nvPr/>
+        </p:nvGrpSpPr>
+        <p:grpSpPr>
+          <a:xfrm>
+            <a:off x="5851063" y="1049791"/>
+            <a:ext cx="2125579" cy="4804611"/>
+            <a:chOff x="7860633" y="1026694"/>
+            <a:chExt cx="2125579" cy="4804611"/>
+          </a:xfrm>
+        </p:grpSpPr>
+        <p:sp>
+          <p:nvSpPr>
+            <p:cNvPr id="4" name="楕円 3">
+              <a:extLst>
+                <a:ext uri="{FF2B5EF4-FFF2-40B4-BE49-F238E27FC236}">
+                  <a16:creationId xmlns:a16="http://schemas.microsoft.com/office/drawing/2014/main" id="{EF499C8E-6705-41EE-A4C7-57233D4E5895}"/>
+                </a:ext>
+              </a:extLst>
+            </p:cNvPr>
+            <p:cNvSpPr/>
+            <p:nvPr/>
+          </p:nvSpPr>
+          <p:spPr>
+            <a:xfrm>
+              <a:off x="7860633" y="1026694"/>
+              <a:ext cx="2125579" cy="4804611"/>
+            </a:xfrm>
+            <a:prstGeom prst="ellipse">
+              <a:avLst/>
+            </a:prstGeom>
+            <a:solidFill>
+              <a:schemeClr val="accent5">
+                <a:lumMod val="60000"/>
+                <a:lumOff val="40000"/>
+              </a:schemeClr>
+            </a:solidFill>
+            <a:ln w="28575">
+              <a:solidFill>
+                <a:schemeClr val="accent5">
+                  <a:lumMod val="50000"/>
+                </a:schemeClr>
+              </a:solidFill>
+            </a:ln>
+          </p:spPr>
+          <p:style>
+            <a:lnRef idx="2">
+              <a:schemeClr val="accent1">
+                <a:shade val="50000"/>
+              </a:schemeClr>
+            </a:lnRef>
+            <a:fillRef idx="1">
+              <a:schemeClr val="accent1"/>
+            </a:fillRef>
+            <a:effectRef idx="0">
+              <a:schemeClr val="accent1"/>
+            </a:effectRef>
+            <a:fontRef idx="minor">
+              <a:schemeClr val="lt1"/>
+            </a:fontRef>
+          </p:style>
+          <p:txBody>
+            <a:bodyPr rtlCol="0" anchor="ctr"/>
+            <a:lstStyle/>
+            <a:p>
+              <a:pPr algn="ctr"/>
+              <a:endParaRPr kumimoji="1" lang="ja-JP" altLang="en-US" dirty="0"/>
+            </a:p>
+          </p:txBody>
+        </p:sp>
+        <p:sp>
+          <p:nvSpPr>
+            <p:cNvPr id="5" name="テキスト ボックス 4">
+              <a:extLst>
+                <a:ext uri="{FF2B5EF4-FFF2-40B4-BE49-F238E27FC236}">
+                  <a16:creationId xmlns:a16="http://schemas.microsoft.com/office/drawing/2014/main" id="{3CAB92BF-D617-4A2E-B4FE-04CB0F829506}"/>
+                </a:ext>
+              </a:extLst>
+            </p:cNvPr>
+            <p:cNvSpPr txBox="1"/>
+            <p:nvPr/>
+          </p:nvSpPr>
+          <p:spPr>
+            <a:xfrm>
+              <a:off x="8032109" y="1952740"/>
+              <a:ext cx="1659775" cy="646331"/>
+            </a:xfrm>
+            <a:prstGeom prst="rect">
+              <a:avLst/>
+            </a:prstGeom>
+            <a:noFill/>
+          </p:spPr>
+          <p:txBody>
+            <a:bodyPr vert="horz" wrap="square" rtlCol="0">
+              <a:spAutoFit/>
+            </a:bodyPr>
+            <a:lstStyle/>
+            <a:p>
+              <a:pPr algn="ctr"/>
+              <a:r>
+                <a:rPr kumimoji="1" lang="ja-JP" altLang="en-US" sz="3600" dirty="0"/>
+                <a:t>ルータ</a:t>
+              </a:r>
+            </a:p>
+          </p:txBody>
+        </p:sp>
+      </p:grpSp>
+      <p:grpSp>
+        <p:nvGrpSpPr>
+          <p:cNvPr id="11" name="グループ化 10">
+            <a:extLst>
+              <a:ext uri="{FF2B5EF4-FFF2-40B4-BE49-F238E27FC236}">
+                <a16:creationId xmlns:a16="http://schemas.microsoft.com/office/drawing/2014/main" id="{723FEB63-6A3C-4E21-A71B-8072AD1EF608}"/>
+              </a:ext>
+            </a:extLst>
+          </p:cNvPr>
+          <p:cNvGrpSpPr/>
+          <p:nvPr/>
+        </p:nvGrpSpPr>
+        <p:grpSpPr>
+          <a:xfrm>
+            <a:off x="349895" y="1786997"/>
+            <a:ext cx="2302042" cy="3232484"/>
+            <a:chOff x="1524000" y="1026694"/>
+            <a:chExt cx="2302042" cy="2261937"/>
+          </a:xfrm>
+        </p:grpSpPr>
+        <p:sp>
+          <p:nvSpPr>
+            <p:cNvPr id="6" name="四角形: 角を丸くする 5">
+              <a:extLst>
+                <a:ext uri="{FF2B5EF4-FFF2-40B4-BE49-F238E27FC236}">
+                  <a16:creationId xmlns:a16="http://schemas.microsoft.com/office/drawing/2014/main" id="{B4D258EA-3A7C-498B-9504-F288495D5D14}"/>
+                </a:ext>
+              </a:extLst>
+            </p:cNvPr>
+            <p:cNvSpPr/>
+            <p:nvPr/>
+          </p:nvSpPr>
+          <p:spPr>
+            <a:xfrm>
+              <a:off x="1524000" y="1026694"/>
+              <a:ext cx="2302042" cy="2261937"/>
+            </a:xfrm>
+            <a:prstGeom prst="roundRect">
+              <a:avLst/>
+            </a:prstGeom>
+            <a:solidFill>
+              <a:schemeClr val="accent4">
+                <a:lumMod val="40000"/>
+                <a:lumOff val="60000"/>
+              </a:schemeClr>
+            </a:solidFill>
+            <a:ln w="19050">
+              <a:solidFill>
+                <a:schemeClr val="accent4">
+                  <a:lumMod val="50000"/>
+                </a:schemeClr>
+              </a:solidFill>
+            </a:ln>
+          </p:spPr>
+          <p:style>
+            <a:lnRef idx="2">
+              <a:schemeClr val="accent2">
+                <a:shade val="50000"/>
+              </a:schemeClr>
+            </a:lnRef>
+            <a:fillRef idx="1">
+              <a:schemeClr val="accent2"/>
+            </a:fillRef>
+            <a:effectRef idx="0">
+              <a:schemeClr val="accent2"/>
+            </a:effectRef>
+            <a:fontRef idx="minor">
+              <a:schemeClr val="lt1"/>
+            </a:fontRef>
+          </p:style>
+          <p:txBody>
+            <a:bodyPr rtlCol="0" anchor="ctr"/>
+            <a:lstStyle/>
+            <a:p>
+              <a:pPr algn="ctr"/>
+              <a:endParaRPr kumimoji="1" lang="ja-JP" altLang="en-US"/>
+            </a:p>
+          </p:txBody>
+        </p:sp>
+        <p:sp>
+          <p:nvSpPr>
+            <p:cNvPr id="8" name="テキスト ボックス 7">
+              <a:extLst>
+                <a:ext uri="{FF2B5EF4-FFF2-40B4-BE49-F238E27FC236}">
+                  <a16:creationId xmlns:a16="http://schemas.microsoft.com/office/drawing/2014/main" id="{1EA830AF-61C0-4024-ABD4-8A5E6CD2A54A}"/>
+                </a:ext>
+              </a:extLst>
+            </p:cNvPr>
+            <p:cNvSpPr txBox="1"/>
+            <p:nvPr/>
+          </p:nvSpPr>
+          <p:spPr>
+            <a:xfrm>
+              <a:off x="1524000" y="1931526"/>
+              <a:ext cx="2302042" cy="452271"/>
+            </a:xfrm>
+            <a:prstGeom prst="rect">
+              <a:avLst/>
+            </a:prstGeom>
+            <a:noFill/>
+          </p:spPr>
+          <p:txBody>
+            <a:bodyPr vert="horz" wrap="square" rtlCol="0" anchor="ctr">
+              <a:spAutoFit/>
+            </a:bodyPr>
+            <a:lstStyle/>
+            <a:p>
+              <a:pPr algn="ctr"/>
+              <a:r>
+                <a:rPr kumimoji="1" lang="en-US" altLang="ja-JP" sz="3600" dirty="0"/>
+                <a:t>PC-A</a:t>
+              </a:r>
+              <a:endParaRPr kumimoji="1" lang="ja-JP" altLang="en-US" sz="3600" dirty="0"/>
+            </a:p>
+          </p:txBody>
+        </p:sp>
+      </p:grpSp>
+      <p:grpSp>
+        <p:nvGrpSpPr>
+          <p:cNvPr id="23" name="グループ化 22">
+            <a:extLst>
+              <a:ext uri="{FF2B5EF4-FFF2-40B4-BE49-F238E27FC236}">
+                <a16:creationId xmlns:a16="http://schemas.microsoft.com/office/drawing/2014/main" id="{909AD43A-DE8C-460C-B921-B9D8B0B25115}"/>
+              </a:ext>
+            </a:extLst>
+          </p:cNvPr>
+          <p:cNvGrpSpPr/>
+          <p:nvPr/>
+        </p:nvGrpSpPr>
+        <p:grpSpPr>
+          <a:xfrm>
+            <a:off x="2651936" y="2760120"/>
+            <a:ext cx="3179368" cy="1337758"/>
+            <a:chOff x="3196131" y="2599071"/>
+            <a:chExt cx="3179368" cy="1337758"/>
+          </a:xfrm>
+        </p:grpSpPr>
+        <p:sp>
+          <p:nvSpPr>
+            <p:cNvPr id="14" name="矢印: 右 13">
+              <a:extLst>
+                <a:ext uri="{FF2B5EF4-FFF2-40B4-BE49-F238E27FC236}">
+                  <a16:creationId xmlns:a16="http://schemas.microsoft.com/office/drawing/2014/main" id="{F26A1FF4-54B5-4717-ABE6-1B5A6452469F}"/>
+                </a:ext>
+              </a:extLst>
+            </p:cNvPr>
+            <p:cNvSpPr/>
+            <p:nvPr/>
+          </p:nvSpPr>
+          <p:spPr>
+            <a:xfrm>
+              <a:off x="3196133" y="2969474"/>
+              <a:ext cx="3179366" cy="272716"/>
+            </a:xfrm>
+            <a:prstGeom prst="rightArrow">
+              <a:avLst/>
+            </a:prstGeom>
+          </p:spPr>
+          <p:style>
+            <a:lnRef idx="2">
+              <a:schemeClr val="accent1">
+                <a:shade val="50000"/>
+              </a:schemeClr>
+            </a:lnRef>
+            <a:fillRef idx="1">
+              <a:schemeClr val="accent1"/>
+            </a:fillRef>
+            <a:effectRef idx="0">
+              <a:schemeClr val="accent1"/>
+            </a:effectRef>
+            <a:fontRef idx="minor">
+              <a:schemeClr val="lt1"/>
+            </a:fontRef>
+          </p:style>
+          <p:txBody>
+            <a:bodyPr rtlCol="0" anchor="ctr"/>
+            <a:lstStyle/>
+            <a:p>
+              <a:pPr algn="ctr"/>
+              <a:endParaRPr kumimoji="1" lang="ja-JP" altLang="en-US" dirty="0"/>
+            </a:p>
+          </p:txBody>
+        </p:sp>
+        <p:sp>
+          <p:nvSpPr>
+            <p:cNvPr id="16" name="テキスト ボックス 15">
+              <a:extLst>
+                <a:ext uri="{FF2B5EF4-FFF2-40B4-BE49-F238E27FC236}">
+                  <a16:creationId xmlns:a16="http://schemas.microsoft.com/office/drawing/2014/main" id="{50CDAB35-E021-449B-812C-A54F8623B362}"/>
+                </a:ext>
+              </a:extLst>
+            </p:cNvPr>
+            <p:cNvSpPr txBox="1"/>
+            <p:nvPr/>
+          </p:nvSpPr>
+          <p:spPr>
+            <a:xfrm>
+              <a:off x="3417832" y="2599071"/>
+              <a:ext cx="2262729" cy="369332"/>
+            </a:xfrm>
+            <a:prstGeom prst="rect">
+              <a:avLst/>
+            </a:prstGeom>
+            <a:noFill/>
+          </p:spPr>
+          <p:txBody>
+            <a:bodyPr wrap="square" rtlCol="0">
+              <a:spAutoFit/>
+            </a:bodyPr>
+            <a:lstStyle/>
+            <a:p>
+              <a:r>
+                <a:rPr kumimoji="1" lang="ja-JP" altLang="en-US" dirty="0"/>
+                <a:t>ポート </a:t>
+              </a:r>
+              <a:r>
+                <a:rPr kumimoji="1" lang="en-US" altLang="ja-JP" dirty="0"/>
+                <a:t>N</a:t>
+              </a:r>
+              <a:r>
+                <a:rPr kumimoji="1" lang="ja-JP" altLang="en-US" dirty="0"/>
+                <a:t>からの通信</a:t>
+              </a:r>
+            </a:p>
+          </p:txBody>
+        </p:sp>
+        <p:sp>
+          <p:nvSpPr>
+            <p:cNvPr id="17" name="テキスト ボックス 16">
+              <a:extLst>
+                <a:ext uri="{FF2B5EF4-FFF2-40B4-BE49-F238E27FC236}">
+                  <a16:creationId xmlns:a16="http://schemas.microsoft.com/office/drawing/2014/main" id="{6C00C7FA-96FE-46E8-809A-977EF0A289C4}"/>
+                </a:ext>
+              </a:extLst>
+            </p:cNvPr>
+            <p:cNvSpPr txBox="1"/>
+            <p:nvPr/>
+          </p:nvSpPr>
+          <p:spPr>
+            <a:xfrm>
+              <a:off x="3383648" y="3567497"/>
+              <a:ext cx="2436886" cy="369332"/>
+            </a:xfrm>
+            <a:prstGeom prst="rect">
+              <a:avLst/>
+            </a:prstGeom>
+            <a:noFill/>
+          </p:spPr>
+          <p:txBody>
+            <a:bodyPr wrap="square" rtlCol="0">
+              <a:spAutoFit/>
+            </a:bodyPr>
+            <a:lstStyle/>
+            <a:p>
+              <a:r>
+                <a:rPr kumimoji="1" lang="ja-JP" altLang="en-US" dirty="0"/>
+                <a:t>ポート </a:t>
+              </a:r>
+              <a:r>
+                <a:rPr lang="en-US" altLang="ja-JP" dirty="0"/>
+                <a:t>M</a:t>
+              </a:r>
+              <a:r>
+                <a:rPr lang="ja-JP" altLang="en-US" dirty="0"/>
+                <a:t>からの通信</a:t>
+              </a:r>
+              <a:endParaRPr kumimoji="1" lang="ja-JP" altLang="en-US" dirty="0"/>
+            </a:p>
+          </p:txBody>
+        </p:sp>
+        <p:sp>
+          <p:nvSpPr>
+            <p:cNvPr id="18" name="矢印: 右 17">
+              <a:extLst>
+                <a:ext uri="{FF2B5EF4-FFF2-40B4-BE49-F238E27FC236}">
+                  <a16:creationId xmlns:a16="http://schemas.microsoft.com/office/drawing/2014/main" id="{7E6ED29A-1F1C-4CE5-8452-C45A026692A9}"/>
+                </a:ext>
+              </a:extLst>
+            </p:cNvPr>
+            <p:cNvSpPr/>
+            <p:nvPr/>
+          </p:nvSpPr>
+          <p:spPr>
+            <a:xfrm>
+              <a:off x="3196131" y="3292639"/>
+              <a:ext cx="3179366" cy="272716"/>
+            </a:xfrm>
+            <a:prstGeom prst="rightArrow">
+              <a:avLst/>
+            </a:prstGeom>
+          </p:spPr>
+          <p:style>
+            <a:lnRef idx="2">
+              <a:schemeClr val="accent1">
+                <a:shade val="50000"/>
+              </a:schemeClr>
+            </a:lnRef>
+            <a:fillRef idx="1">
+              <a:schemeClr val="accent1"/>
+            </a:fillRef>
+            <a:effectRef idx="0">
+              <a:schemeClr val="accent1"/>
+            </a:effectRef>
+            <a:fontRef idx="minor">
+              <a:schemeClr val="lt1"/>
+            </a:fontRef>
+          </p:style>
+          <p:txBody>
+            <a:bodyPr rtlCol="0" anchor="ctr"/>
+            <a:lstStyle/>
+            <a:p>
+              <a:pPr algn="ctr"/>
+              <a:endParaRPr kumimoji="1" lang="ja-JP" altLang="en-US"/>
+            </a:p>
+          </p:txBody>
+        </p:sp>
+      </p:grpSp>
+      <p:sp>
+        <p:nvSpPr>
+          <p:cNvPr id="26" name="テキスト ボックス 25">
+            <a:extLst>
+              <a:ext uri="{FF2B5EF4-FFF2-40B4-BE49-F238E27FC236}">
+                <a16:creationId xmlns:a16="http://schemas.microsoft.com/office/drawing/2014/main" id="{E5E66878-C8C8-4FC4-8024-45AE4529FA70}"/>
+              </a:ext>
+            </a:extLst>
+          </p:cNvPr>
+          <p:cNvSpPr txBox="1"/>
+          <p:nvPr/>
+        </p:nvSpPr>
+        <p:spPr>
+          <a:xfrm>
+            <a:off x="2569419" y="2247620"/>
+            <a:ext cx="1659775" cy="383309"/>
+          </a:xfrm>
+          <a:prstGeom prst="rect">
+            <a:avLst/>
+          </a:prstGeom>
+          <a:noFill/>
+        </p:spPr>
+        <p:txBody>
+          <a:bodyPr wrap="square" rtlCol="0">
+            <a:spAutoFit/>
+          </a:bodyPr>
+          <a:lstStyle/>
+          <a:p>
+            <a:r>
+              <a:rPr kumimoji="1" lang="en-US" altLang="ja-JP" dirty="0"/>
+              <a:t>192.168.11.2</a:t>
+            </a:r>
+            <a:endParaRPr kumimoji="1" lang="ja-JP" altLang="en-US" dirty="0"/>
+          </a:p>
+        </p:txBody>
+      </p:sp>
+      <p:sp>
+        <p:nvSpPr>
+          <p:cNvPr id="27" name="テキスト ボックス 26">
+            <a:extLst>
+              <a:ext uri="{FF2B5EF4-FFF2-40B4-BE49-F238E27FC236}">
+                <a16:creationId xmlns:a16="http://schemas.microsoft.com/office/drawing/2014/main" id="{D1C39148-C72C-4BA2-A189-34CAEC8E0B13}"/>
+              </a:ext>
+            </a:extLst>
+          </p:cNvPr>
+          <p:cNvSpPr txBox="1"/>
+          <p:nvPr/>
+        </p:nvSpPr>
+        <p:spPr>
+          <a:xfrm>
+            <a:off x="4400670" y="2261825"/>
+            <a:ext cx="1659775" cy="383309"/>
+          </a:xfrm>
+          <a:prstGeom prst="rect">
+            <a:avLst/>
+          </a:prstGeom>
+          <a:noFill/>
+        </p:spPr>
+        <p:txBody>
+          <a:bodyPr wrap="square" rtlCol="0">
+            <a:spAutoFit/>
+          </a:bodyPr>
+          <a:lstStyle/>
+          <a:p>
+            <a:r>
+              <a:rPr kumimoji="1" lang="en-US" altLang="ja-JP" dirty="0"/>
+              <a:t>192.168.11.1</a:t>
+            </a:r>
+            <a:endParaRPr kumimoji="1" lang="ja-JP" altLang="en-US" dirty="0"/>
+          </a:p>
+        </p:txBody>
+      </p:sp>
+      <p:sp>
+        <p:nvSpPr>
+          <p:cNvPr id="28" name="テキスト ボックス 27">
+            <a:extLst>
+              <a:ext uri="{FF2B5EF4-FFF2-40B4-BE49-F238E27FC236}">
+                <a16:creationId xmlns:a16="http://schemas.microsoft.com/office/drawing/2014/main" id="{FC3DD058-E4DB-44B1-BFCB-89452CAE6638}"/>
+              </a:ext>
+            </a:extLst>
+          </p:cNvPr>
+          <p:cNvSpPr txBox="1"/>
+          <p:nvPr/>
+        </p:nvSpPr>
+        <p:spPr>
+          <a:xfrm>
+            <a:off x="7936535" y="2271781"/>
+            <a:ext cx="1659775" cy="383309"/>
+          </a:xfrm>
+          <a:prstGeom prst="rect">
+            <a:avLst/>
+          </a:prstGeom>
+          <a:noFill/>
+        </p:spPr>
+        <p:txBody>
+          <a:bodyPr wrap="square" rtlCol="0">
+            <a:spAutoFit/>
+          </a:bodyPr>
+          <a:lstStyle/>
+          <a:p>
+            <a:r>
+              <a:rPr kumimoji="1" lang="ja-JP" altLang="en-US" dirty="0"/>
+              <a:t>グローバル</a:t>
+            </a:r>
+            <a:r>
+              <a:rPr kumimoji="1" lang="en-US" altLang="ja-JP" dirty="0"/>
+              <a:t>IP</a:t>
+            </a:r>
+            <a:endParaRPr kumimoji="1" lang="ja-JP" altLang="en-US" dirty="0"/>
+          </a:p>
+        </p:txBody>
+      </p:sp>
+      <p:sp>
+        <p:nvSpPr>
+          <p:cNvPr id="40" name="矢印: 右 39">
+            <a:extLst>
+              <a:ext uri="{FF2B5EF4-FFF2-40B4-BE49-F238E27FC236}">
+                <a16:creationId xmlns:a16="http://schemas.microsoft.com/office/drawing/2014/main" id="{B1E7083E-A50A-4A6C-9219-BFB89684526B}"/>
+              </a:ext>
+            </a:extLst>
+          </p:cNvPr>
+          <p:cNvSpPr/>
+          <p:nvPr/>
+        </p:nvSpPr>
+        <p:spPr>
+          <a:xfrm>
+            <a:off x="5851061" y="3154685"/>
+            <a:ext cx="2145340" cy="272716"/>
+          </a:xfrm>
+          <a:prstGeom prst="rightArrow">
+            <a:avLst/>
+          </a:prstGeom>
+        </p:spPr>
+        <p:style>
+          <a:lnRef idx="2">
+            <a:schemeClr val="accent1">
+              <a:shade val="50000"/>
+            </a:schemeClr>
+          </a:lnRef>
+          <a:fillRef idx="1">
+            <a:schemeClr val="accent1"/>
+          </a:fillRef>
+          <a:effectRef idx="0">
+            <a:schemeClr val="accent1"/>
+          </a:effectRef>
+          <a:fontRef idx="minor">
+            <a:schemeClr val="lt1"/>
+          </a:fontRef>
+        </p:style>
+        <p:txBody>
+          <a:bodyPr rtlCol="0" anchor="ctr"/>
+          <a:lstStyle/>
+          <a:p>
+            <a:pPr algn="ctr"/>
+            <a:endParaRPr kumimoji="1" lang="ja-JP" altLang="en-US" dirty="0"/>
+          </a:p>
+        </p:txBody>
+      </p:sp>
+      <p:sp>
+        <p:nvSpPr>
+          <p:cNvPr id="41" name="矢印: 右 40">
+            <a:extLst>
+              <a:ext uri="{FF2B5EF4-FFF2-40B4-BE49-F238E27FC236}">
+                <a16:creationId xmlns:a16="http://schemas.microsoft.com/office/drawing/2014/main" id="{2F091A81-DBF1-402B-B378-AA35FCF06EC3}"/>
+              </a:ext>
+            </a:extLst>
+          </p:cNvPr>
+          <p:cNvSpPr/>
+          <p:nvPr/>
+        </p:nvSpPr>
+        <p:spPr>
+          <a:xfrm>
+            <a:off x="5851060" y="3476259"/>
+            <a:ext cx="2145339" cy="272716"/>
+          </a:xfrm>
+          <a:prstGeom prst="rightArrow">
+            <a:avLst/>
+          </a:prstGeom>
+        </p:spPr>
+        <p:style>
+          <a:lnRef idx="2">
+            <a:schemeClr val="accent1">
+              <a:shade val="50000"/>
+            </a:schemeClr>
+          </a:lnRef>
+          <a:fillRef idx="1">
+            <a:schemeClr val="accent1"/>
+          </a:fillRef>
+          <a:effectRef idx="0">
+            <a:schemeClr val="accent1"/>
+          </a:effectRef>
+          <a:fontRef idx="minor">
+            <a:schemeClr val="lt1"/>
+          </a:fontRef>
+        </p:style>
+        <p:txBody>
+          <a:bodyPr rtlCol="0" anchor="ctr"/>
+          <a:lstStyle/>
+          <a:p>
+            <a:pPr algn="ctr"/>
+            <a:endParaRPr kumimoji="1" lang="ja-JP" altLang="en-US" dirty="0"/>
+          </a:p>
+        </p:txBody>
+      </p:sp>
+      <p:sp>
+        <p:nvSpPr>
+          <p:cNvPr id="42" name="矢印: 右 41">
+            <a:extLst>
+              <a:ext uri="{FF2B5EF4-FFF2-40B4-BE49-F238E27FC236}">
+                <a16:creationId xmlns:a16="http://schemas.microsoft.com/office/drawing/2014/main" id="{E041B137-470A-48B2-8AA5-913483F769A0}"/>
+              </a:ext>
+            </a:extLst>
+          </p:cNvPr>
+          <p:cNvSpPr/>
+          <p:nvPr/>
+        </p:nvSpPr>
+        <p:spPr>
+          <a:xfrm>
+            <a:off x="7966469" y="3179114"/>
+            <a:ext cx="2085474" cy="272716"/>
+          </a:xfrm>
+          <a:prstGeom prst="rightArrow">
+            <a:avLst/>
+          </a:prstGeom>
+        </p:spPr>
+        <p:style>
+          <a:lnRef idx="2">
+            <a:schemeClr val="accent1">
+              <a:shade val="50000"/>
+            </a:schemeClr>
+          </a:lnRef>
+          <a:fillRef idx="1">
+            <a:schemeClr val="accent1"/>
+          </a:fillRef>
+          <a:effectRef idx="0">
+            <a:schemeClr val="accent1"/>
+          </a:effectRef>
+          <a:fontRef idx="minor">
+            <a:schemeClr val="lt1"/>
+          </a:fontRef>
+        </p:style>
+        <p:txBody>
+          <a:bodyPr rtlCol="0" anchor="ctr"/>
+          <a:lstStyle/>
+          <a:p>
+            <a:pPr algn="ctr"/>
+            <a:endParaRPr kumimoji="1" lang="ja-JP" altLang="en-US" dirty="0"/>
+          </a:p>
+        </p:txBody>
+      </p:sp>
+      <p:sp>
+        <p:nvSpPr>
+          <p:cNvPr id="43" name="矢印: 右 42">
+            <a:extLst>
+              <a:ext uri="{FF2B5EF4-FFF2-40B4-BE49-F238E27FC236}">
+                <a16:creationId xmlns:a16="http://schemas.microsoft.com/office/drawing/2014/main" id="{40753307-5C8D-4666-A0F2-8F0C5A3D149B}"/>
+              </a:ext>
+            </a:extLst>
+          </p:cNvPr>
+          <p:cNvSpPr/>
+          <p:nvPr/>
+        </p:nvSpPr>
+        <p:spPr>
+          <a:xfrm>
+            <a:off x="7956295" y="3476259"/>
+            <a:ext cx="2085474" cy="272716"/>
+          </a:xfrm>
+          <a:prstGeom prst="rightArrow">
+            <a:avLst/>
+          </a:prstGeom>
+        </p:spPr>
+        <p:style>
+          <a:lnRef idx="2">
+            <a:schemeClr val="accent1">
+              <a:shade val="50000"/>
+            </a:schemeClr>
+          </a:lnRef>
+          <a:fillRef idx="1">
+            <a:schemeClr val="accent1"/>
+          </a:fillRef>
+          <a:effectRef idx="0">
+            <a:schemeClr val="accent1"/>
+          </a:effectRef>
+          <a:fontRef idx="minor">
+            <a:schemeClr val="lt1"/>
+          </a:fontRef>
+        </p:style>
+        <p:txBody>
+          <a:bodyPr rtlCol="0" anchor="ctr"/>
+          <a:lstStyle/>
+          <a:p>
+            <a:pPr algn="ctr"/>
+            <a:endParaRPr kumimoji="1" lang="ja-JP" altLang="en-US" dirty="0"/>
+          </a:p>
+        </p:txBody>
+      </p:sp>
+      <p:sp>
+        <p:nvSpPr>
+          <p:cNvPr id="44" name="テキスト ボックス 43">
+            <a:extLst>
+              <a:ext uri="{FF2B5EF4-FFF2-40B4-BE49-F238E27FC236}">
+                <a16:creationId xmlns:a16="http://schemas.microsoft.com/office/drawing/2014/main" id="{7CF293D2-6910-4869-B391-16A815D75710}"/>
+              </a:ext>
+            </a:extLst>
+          </p:cNvPr>
+          <p:cNvSpPr txBox="1"/>
+          <p:nvPr/>
+        </p:nvSpPr>
+        <p:spPr>
+          <a:xfrm>
+            <a:off x="7867668" y="2867481"/>
+            <a:ext cx="2262729" cy="369332"/>
+          </a:xfrm>
+          <a:prstGeom prst="rect">
+            <a:avLst/>
+          </a:prstGeom>
+          <a:noFill/>
+        </p:spPr>
+        <p:txBody>
+          <a:bodyPr wrap="square" rtlCol="0">
+            <a:spAutoFit/>
+          </a:bodyPr>
+          <a:lstStyle/>
+          <a:p>
+            <a:r>
+              <a:rPr kumimoji="1" lang="ja-JP" altLang="en-US" dirty="0"/>
+              <a:t>ポート </a:t>
+            </a:r>
+            <a:r>
+              <a:rPr lang="en-US" altLang="ja-JP" dirty="0"/>
+              <a:t>K</a:t>
+            </a:r>
+            <a:r>
+              <a:rPr kumimoji="1" lang="ja-JP" altLang="en-US" dirty="0"/>
+              <a:t>からの通信</a:t>
+            </a:r>
+          </a:p>
+        </p:txBody>
+      </p:sp>
+      <p:sp>
+        <p:nvSpPr>
+          <p:cNvPr id="45" name="テキスト ボックス 44">
+            <a:extLst>
+              <a:ext uri="{FF2B5EF4-FFF2-40B4-BE49-F238E27FC236}">
+                <a16:creationId xmlns:a16="http://schemas.microsoft.com/office/drawing/2014/main" id="{0F243520-53A1-40DE-B403-0E98E0B8FD2C}"/>
+              </a:ext>
+            </a:extLst>
+          </p:cNvPr>
+          <p:cNvSpPr txBox="1"/>
+          <p:nvPr/>
+        </p:nvSpPr>
+        <p:spPr>
+          <a:xfrm>
+            <a:off x="5863167" y="2804549"/>
+            <a:ext cx="2021158" cy="307777"/>
+          </a:xfrm>
+          <a:prstGeom prst="rect">
+            <a:avLst/>
+          </a:prstGeom>
+          <a:noFill/>
+        </p:spPr>
+        <p:txBody>
+          <a:bodyPr wrap="square" rtlCol="0">
+            <a:spAutoFit/>
+          </a:bodyPr>
+          <a:lstStyle/>
+          <a:p>
+            <a:r>
+              <a:rPr kumimoji="1" lang="ja-JP" altLang="en-US" sz="1400" dirty="0"/>
+              <a:t>対応するポートを</a:t>
+            </a:r>
+            <a:r>
+              <a:rPr lang="ja-JP" altLang="en-US" sz="1400" dirty="0"/>
+              <a:t>決定</a:t>
+            </a:r>
+            <a:endParaRPr kumimoji="1" lang="ja-JP" altLang="en-US" sz="1400" dirty="0"/>
+          </a:p>
+        </p:txBody>
+      </p:sp>
+      <p:sp>
+        <p:nvSpPr>
+          <p:cNvPr id="46" name="テキスト ボックス 45">
+            <a:extLst>
+              <a:ext uri="{FF2B5EF4-FFF2-40B4-BE49-F238E27FC236}">
+                <a16:creationId xmlns:a16="http://schemas.microsoft.com/office/drawing/2014/main" id="{4AAB41D1-4542-40AD-8E6F-B116E639DCAA}"/>
+              </a:ext>
+            </a:extLst>
+          </p:cNvPr>
+          <p:cNvSpPr txBox="1"/>
+          <p:nvPr/>
+        </p:nvSpPr>
+        <p:spPr>
+          <a:xfrm>
+            <a:off x="7867668" y="3726402"/>
+            <a:ext cx="2262729" cy="369332"/>
+          </a:xfrm>
+          <a:prstGeom prst="rect">
+            <a:avLst/>
+          </a:prstGeom>
+          <a:noFill/>
+        </p:spPr>
+        <p:txBody>
+          <a:bodyPr wrap="square" rtlCol="0">
+            <a:spAutoFit/>
+          </a:bodyPr>
+          <a:lstStyle/>
+          <a:p>
+            <a:r>
+              <a:rPr kumimoji="1" lang="ja-JP" altLang="en-US" dirty="0"/>
+              <a:t>ポート </a:t>
+            </a:r>
+            <a:r>
+              <a:rPr kumimoji="1" lang="en-US" altLang="ja-JP" dirty="0"/>
+              <a:t>T</a:t>
+            </a:r>
+            <a:r>
+              <a:rPr kumimoji="1" lang="ja-JP" altLang="en-US" dirty="0"/>
+              <a:t>からの通信</a:t>
+            </a:r>
+          </a:p>
+        </p:txBody>
+      </p:sp>
+      <p:grpSp>
+        <p:nvGrpSpPr>
+          <p:cNvPr id="7" name="グループ化 6">
+            <a:extLst>
+              <a:ext uri="{FF2B5EF4-FFF2-40B4-BE49-F238E27FC236}">
+                <a16:creationId xmlns:a16="http://schemas.microsoft.com/office/drawing/2014/main" id="{19D2DD80-E0EC-4462-B905-ED7022CDAC75}"/>
+              </a:ext>
+            </a:extLst>
+          </p:cNvPr>
+          <p:cNvGrpSpPr/>
+          <p:nvPr/>
+        </p:nvGrpSpPr>
+        <p:grpSpPr>
+          <a:xfrm>
+            <a:off x="10150744" y="1832649"/>
+            <a:ext cx="1659775" cy="3514794"/>
+            <a:chOff x="10170249" y="1738996"/>
+            <a:chExt cx="1659775" cy="3514794"/>
+          </a:xfrm>
+        </p:grpSpPr>
+        <p:sp>
+          <p:nvSpPr>
+            <p:cNvPr id="2" name="雲 1">
+              <a:extLst>
+                <a:ext uri="{FF2B5EF4-FFF2-40B4-BE49-F238E27FC236}">
+                  <a16:creationId xmlns:a16="http://schemas.microsoft.com/office/drawing/2014/main" id="{62B10013-A7E2-41B6-B23F-F005031BDD26}"/>
+                </a:ext>
+              </a:extLst>
+            </p:cNvPr>
+            <p:cNvSpPr/>
+            <p:nvPr/>
+          </p:nvSpPr>
+          <p:spPr>
+            <a:xfrm>
+              <a:off x="10170249" y="1738996"/>
+              <a:ext cx="1659775" cy="3514794"/>
+            </a:xfrm>
+            <a:prstGeom prst="cloud">
+              <a:avLst/>
+            </a:prstGeom>
+            <a:solidFill>
+              <a:schemeClr val="bg1">
+                <a:lumMod val="95000"/>
+              </a:schemeClr>
+            </a:solidFill>
+            <a:ln>
+              <a:solidFill>
+                <a:schemeClr val="tx1">
+                  <a:lumMod val="85000"/>
+                  <a:lumOff val="15000"/>
+                </a:schemeClr>
+              </a:solidFill>
+            </a:ln>
+          </p:spPr>
+          <p:style>
+            <a:lnRef idx="2">
+              <a:schemeClr val="accent1">
+                <a:shade val="50000"/>
+              </a:schemeClr>
+            </a:lnRef>
+            <a:fillRef idx="1">
+              <a:schemeClr val="accent1"/>
+            </a:fillRef>
+            <a:effectRef idx="0">
+              <a:schemeClr val="accent1"/>
+            </a:effectRef>
+            <a:fontRef idx="minor">
+              <a:schemeClr val="lt1"/>
+            </a:fontRef>
+          </p:style>
+          <p:txBody>
+            <a:bodyPr rtlCol="0" anchor="ctr"/>
+            <a:lstStyle/>
+            <a:p>
+              <a:pPr algn="ctr"/>
+              <a:endParaRPr kumimoji="1" lang="ja-JP" altLang="en-US"/>
+            </a:p>
+          </p:txBody>
+        </p:sp>
+        <p:sp>
+          <p:nvSpPr>
+            <p:cNvPr id="3" name="テキスト ボックス 2">
+              <a:extLst>
+                <a:ext uri="{FF2B5EF4-FFF2-40B4-BE49-F238E27FC236}">
+                  <a16:creationId xmlns:a16="http://schemas.microsoft.com/office/drawing/2014/main" id="{4E838271-4B77-44B6-BB5E-5535A192341A}"/>
+                </a:ext>
+              </a:extLst>
+            </p:cNvPr>
+            <p:cNvSpPr txBox="1"/>
+            <p:nvPr/>
+          </p:nvSpPr>
+          <p:spPr>
+            <a:xfrm>
+              <a:off x="10258926" y="3161891"/>
+              <a:ext cx="1507958" cy="584775"/>
+            </a:xfrm>
+            <a:prstGeom prst="rect">
+              <a:avLst/>
+            </a:prstGeom>
+            <a:noFill/>
+          </p:spPr>
+          <p:txBody>
+            <a:bodyPr wrap="square" rtlCol="0" anchor="ctr">
+              <a:spAutoFit/>
+            </a:bodyPr>
+            <a:lstStyle/>
+            <a:p>
+              <a:pPr algn="ctr"/>
+              <a:r>
+                <a:rPr kumimoji="1" lang="ja-JP" altLang="en-US" sz="3200" dirty="0"/>
+                <a:t>ネット</a:t>
+              </a:r>
+            </a:p>
+          </p:txBody>
+        </p:sp>
+      </p:grpSp>
+    </p:spTree>
+    <p:extLst>
+      <p:ext uri="{BB962C8B-B14F-4D97-AF65-F5344CB8AC3E}">
+        <p14:creationId xmlns:p14="http://schemas.microsoft.com/office/powerpoint/2010/main" val="1294122131"/>
       </p:ext>
     </p:extLst>
   </p:cSld>

</xml_diff>